<commit_message>
Added raycast mask tutorial
- Loading objects from resource folder
  when collided with raycast
</commit_message>
<xml_diff>
--- a/Assets/Class/Raycast/PPT Data/RayCast Example.pptx
+++ b/Assets/Class/Raycast/PPT Data/RayCast Example.pptx
@@ -2,7 +2,7 @@
 <file path=ppt/presentation.xml><?xml version="1.0" encoding="utf-8"?>
 <p:presentation xmlns:a="http://schemas.openxmlformats.org/drawingml/2006/main" xmlns:r="http://schemas.openxmlformats.org/officeDocument/2006/relationships" xmlns:p="http://schemas.openxmlformats.org/presentationml/2006/main" xmlns:p14="http://schemas.microsoft.com/office/powerpoint/2010/main" saveSubsetFonts="1" firstSlideNum="0">
   <p:sldMasterIdLst>
-    <p:sldMasterId id="2147485833" r:id="rId12"/>
+    <p:sldMasterId id="2147485850" r:id="rId12"/>
   </p:sldMasterIdLst>
   <p:notesMasterIdLst>
     <p:notesMasterId r:id="rId14"/>
@@ -15,6 +15,7 @@
     <p:sldId id="296" r:id="rId20"/>
     <p:sldId id="291" r:id="rId21"/>
     <p:sldId id="299" r:id="rId22"/>
+    <p:sldId id="300" r:id="rId23"/>
   </p:sldIdLst>
   <p:sldSz cx="12192000" cy="6858000"/>
   <p:notesSz cx="6858000" cy="9144000"/>
@@ -1467,6 +1468,148 @@
 </p:notes>
 </file>
 
+<file path=ppt/notesSlides/notesSlide8.xml><?xml version="1.0" encoding="utf-8"?>
+<p:notes xmlns:a="http://schemas.openxmlformats.org/drawingml/2006/main" xmlns:r="http://schemas.openxmlformats.org/officeDocument/2006/relationships" xmlns:p="http://schemas.openxmlformats.org/presentationml/2006/main">
+  <p:cSld>
+    <p:spTree>
+      <p:nvGrpSpPr>
+        <p:cNvPr id="1" name=""/>
+        <p:cNvGrpSpPr/>
+        <p:nvPr/>
+      </p:nvGrpSpPr>
+      <p:grpSpPr>
+        <a:xfrm>
+          <a:off x="0" y="0"/>
+          <a:ext cx="0" cy="0"/>
+          <a:chOff x="0" y="0"/>
+          <a:chExt cx="0" cy="0"/>
+        </a:xfrm>
+      </p:grpSpPr>
+      <p:sp>
+        <p:nvSpPr>
+          <p:cNvPr id="2" name="슬라이드 이미지 개체 틀 3"/>
+          <p:cNvSpPr>
+            <a:spLocks noChangeAspect="1"/>
+          </p:cNvSpPr>
+          <p:nvPr>
+            <p:ph type="sldImg" idx="2"/>
+          </p:nvPr>
+        </p:nvSpPr>
+        <p:spPr>
+          <a:xfrm rot="0">
+            <a:off x="685800" y="1143000"/>
+            <a:ext cx="5491480" cy="3091180"/>
+          </a:xfrm>
+          <a:prstGeom prst="rect"/>
+          <a:noFill/>
+          <a:ln w="12700" cap="flat" cmpd="sng">
+            <a:solidFill>
+              <a:srgbClr val="000000">
+                <a:alpha val="100000"/>
+              </a:srgbClr>
+            </a:solidFill>
+            <a:prstDash val="solid"/>
+          </a:ln>
+        </p:spPr>
+        <p:txBody>
+          <a:bodyPr wrap="square" lIns="91440" tIns="45720" rIns="91440" bIns="45720" numCol="1" vert="horz" anchor="ctr">
+            <a:noAutofit/>
+          </a:bodyPr>
+          <a:lstStyle/>
+          <a:p>
+            <a:pPr marL="0" indent="0" latinLnBrk="0">
+              <a:buFontTx/>
+              <a:buNone/>
+            </a:pPr>
+          </a:p>
+        </p:txBody>
+      </p:sp>
+      <p:sp>
+        <p:nvSpPr>
+          <p:cNvPr id="3" name="슬라이드 노트 개체 틀 4"/>
+          <p:cNvSpPr txBox="1">
+            <a:spLocks/>
+          </p:cNvSpPr>
+          <p:nvPr>
+            <p:ph type="body" idx="3"/>
+          </p:nvPr>
+        </p:nvSpPr>
+        <p:spPr>
+          <a:xfrm rot="0">
+            <a:off x="685800" y="4400550"/>
+            <a:ext cx="5491480" cy="3605530"/>
+          </a:xfrm>
+          <a:prstGeom prst="rect"/>
+        </p:spPr>
+        <p:txBody>
+          <a:bodyPr wrap="square" lIns="91440" tIns="45720" rIns="91440" bIns="45720" numCol="1" vert="horz" anchor="t">
+            <a:noAutofit/>
+          </a:bodyPr>
+          <a:lstStyle/>
+          <a:p>
+            <a:pPr marL="0" indent="0" latinLnBrk="0">
+              <a:buFontTx/>
+              <a:buNone/>
+            </a:pPr>
+          </a:p>
+        </p:txBody>
+      </p:sp>
+      <p:sp>
+        <p:nvSpPr>
+          <p:cNvPr id="4" name="슬라이드 번호 개체 틀 6"/>
+          <p:cNvSpPr txBox="1">
+            <a:spLocks/>
+          </p:cNvSpPr>
+          <p:nvPr>
+            <p:ph type="sldNum" idx="5"/>
+          </p:nvPr>
+        </p:nvSpPr>
+        <p:spPr>
+          <a:xfrm rot="0">
+            <a:off x="3884930" y="8685530"/>
+            <a:ext cx="2976880" cy="463550"/>
+          </a:xfrm>
+          <a:prstGeom prst="rect"/>
+        </p:spPr>
+        <p:txBody>
+          <a:bodyPr wrap="square" lIns="91440" tIns="45720" rIns="91440" bIns="45720" numCol="1" vert="horz" anchor="b">
+            <a:noAutofit/>
+          </a:bodyPr>
+          <a:lstStyle>
+            <a:lvl1pPr marL="0" indent="0" algn="r" latinLnBrk="0">
+              <a:buFontTx/>
+              <a:buNone/>
+              <a:defRPr lang="en-GB" altLang="en-US" sz="1200"/>
+            </a:lvl1pPr>
+          </a:lstStyle>
+          <a:p>
+            <a:pPr marL="0" indent="0" latinLnBrk="0">
+              <a:buFontTx/>
+              <a:buNone/>
+            </a:pPr>
+            <a:fld id="{B9320F77-B9A0-41C5-862A-B4B631284C64}" type="slidenum">
+              <a:rPr lang="ko-KR" altLang="en-US"/>
+              <a:t>‹#›</a:t>
+            </a:fld>
+          </a:p>
+        </p:txBody>
+      </p:sp>
+    </p:spTree>
+  </p:cSld>
+  <p:clrMapOvr>
+    <a:masterClrMapping/>
+  </p:clrMapOvr>
+  <mc:AlternateContent xmlns:mc="http://schemas.openxmlformats.org/markup-compatibility/2006">
+    <mc:Choice xmlns:p14="http://schemas.microsoft.com/office/powerpoint/2010/main" Requires="p14">
+      <p:transition spd="slow" p14:dur="0"/>
+    </mc:Choice>
+    <mc:Fallback>
+      <p:transition spd="slow"/>
+    </mc:Fallback>
+  </mc:AlternateContent>
+</p:notes>
+</file>
+
 <file path=ppt/slideLayouts/slideLayout1.xml><?xml version="1.0" encoding="utf-8"?>
 <p:sldLayout xmlns:a="http://schemas.openxmlformats.org/drawingml/2006/main" xmlns:r="http://schemas.openxmlformats.org/officeDocument/2006/relationships" xmlns:p="http://schemas.openxmlformats.org/presentationml/2006/main" type="title">
   <p:cSld name="제목 슬라이드">
@@ -7847,7 +7990,7 @@
       </p:cxnSp>
       <p:pic>
         <p:nvPicPr>
-          <p:cNvPr id="1140" name="그림 1" descr="C:/Users/Admin1/AppData/Roaming/PolarisOffice/ETemp/3276_19845488/fImage1705614641.png"/>
+          <p:cNvPr id="1140" name="그림 1"/>
           <p:cNvPicPr>
             <a:picLocks noChangeAspect="1"/>
           </p:cNvPicPr>
@@ -7878,7 +8021,7 @@
       </p:pic>
       <p:pic>
         <p:nvPicPr>
-          <p:cNvPr id="1141" name="그림 2" descr="C:/Users/Admin1/AppData/Roaming/PolarisOffice/ETemp/3276_19845488/fImage172401478467.png"/>
+          <p:cNvPr id="1141" name="그림 2"/>
           <p:cNvPicPr>
             <a:picLocks noChangeAspect="1"/>
           </p:cNvPicPr>
@@ -8379,8 +8522,8 @@
         </p:nvSpPr>
         <p:spPr>
           <a:xfrm rot="0">
-            <a:off x="6829425" y="4660265"/>
-            <a:ext cx="4153535" cy="1784985"/>
+            <a:off x="6797040" y="4453255"/>
+            <a:ext cx="4373880" cy="1784985"/>
           </a:xfrm>
           <a:prstGeom prst="rect"/>
           <a:noFill/>
@@ -8407,27 +8550,7 @@
                 <a:latin typeface="맑은 고딕" charset="0"/>
                 <a:ea typeface="맑은 고딕" charset="0"/>
               </a:rPr>
-              <a:t>1</a:t>
-            </a:r>
-            <a:r>
-              <a:rPr lang="ko-KR" sz="2000" b="1">
-                <a:solidFill>
-                  <a:srgbClr val="0611F2"/>
-                </a:solidFill>
-                <a:latin typeface="맑은 고딕" charset="0"/>
-                <a:ea typeface="맑은 고딕" charset="0"/>
-              </a:rPr>
-              <a:t>2</a:t>
-            </a:r>
-            <a:r>
-              <a:rPr lang="ko-KR" sz="2000" b="1">
-                <a:solidFill>
-                  <a:srgbClr val="0611F2"/>
-                </a:solidFill>
-                <a:latin typeface="맑은 고딕" charset="0"/>
-                <a:ea typeface="맑은 고딕" charset="0"/>
-              </a:rPr>
-              <a:t>. </a:t>
+              <a:t>12. </a:t>
             </a:r>
             <a:r>
               <a:rPr lang="ko-KR" sz="1800">
@@ -8461,21 +8584,7 @@
                 <a:latin typeface="맑은 고딕" charset="0"/>
                 <a:ea typeface="맑은 고딕" charset="0"/>
               </a:rPr>
-              <a:t>마우스를 </a:t>
-            </a:r>
-            <a:r>
-              <a:rPr lang="ko-KR" sz="1800">
-                <a:latin typeface="맑은 고딕" charset="0"/>
-                <a:ea typeface="맑은 고딕" charset="0"/>
-              </a:rPr>
-              <a:t>클릭</a:t>
-            </a:r>
-            <a:r>
-              <a:rPr lang="ko-KR" sz="1800">
-                <a:latin typeface="맑은 고딕" charset="0"/>
-                <a:ea typeface="맑은 고딕" charset="0"/>
-              </a:rPr>
-              <a:t>했을 때 좌표를 3D 월드 공간상의 좌표로 변환합니다.</a:t>
+              <a:t>마우스를 클릭했을 때 좌표를 3D 월드 공간상의 좌표로 변환합니다.</a:t>
             </a:r>
             <a:endParaRPr lang="ko-KR" altLang="en-US" sz="1800">
               <a:latin typeface="맑은 고딕" charset="0"/>
@@ -8494,8 +8603,8 @@
         </p:nvSpPr>
         <p:spPr>
           <a:xfrm rot="0">
-            <a:off x="1146810" y="2535555"/>
-            <a:ext cx="4224655" cy="954405"/>
+            <a:off x="1146810" y="2171700"/>
+            <a:ext cx="4225290" cy="955040"/>
           </a:xfrm>
           <a:prstGeom prst="rect"/>
           <a:noFill/>
@@ -8522,69 +8631,14 @@
                 <a:latin typeface="맑은 고딕" charset="0"/>
                 <a:ea typeface="맑은 고딕" charset="0"/>
               </a:rPr>
-              <a:t>1</a:t>
-            </a:r>
-            <a:r>
-              <a:rPr lang="ko-KR" sz="2000" b="1">
-                <a:solidFill>
-                  <a:srgbClr val="0611F2"/>
-                </a:solidFill>
-                <a:latin typeface="맑은 고딕" charset="0"/>
-                <a:ea typeface="맑은 고딕" charset="0"/>
-              </a:rPr>
-              <a:t>0</a:t>
-            </a:r>
-            <a:r>
-              <a:rPr lang="ko-KR" sz="2000" b="1">
-                <a:solidFill>
-                  <a:srgbClr val="0611F2"/>
-                </a:solidFill>
-                <a:latin typeface="맑은 고딕" charset="0"/>
-                <a:ea typeface="맑은 고딕" charset="0"/>
-              </a:rPr>
-              <a:t>. </a:t>
+              <a:t>10. </a:t>
             </a:r>
             <a:r>
               <a:rPr lang="ko-KR" sz="1800">
                 <a:latin typeface="맑은 고딕" charset="0"/>
                 <a:ea typeface="맑은 고딕" charset="0"/>
               </a:rPr>
-              <a:t>그다음으로 P</a:t>
-            </a:r>
-            <a:r>
-              <a:rPr lang="ko-KR" sz="1800">
-                <a:latin typeface="맑은 고딕" charset="0"/>
-                <a:ea typeface="맑은 고딕" charset="0"/>
-              </a:rPr>
-              <a:t>icking 이라는</a:t>
-            </a:r>
-            <a:r>
-              <a:rPr lang="ko-KR" sz="1800">
-                <a:latin typeface="맑은 고딕" charset="0"/>
-                <a:ea typeface="맑은 고딕" charset="0"/>
-              </a:rPr>
-              <a:t> </a:t>
-            </a:r>
-            <a:r>
-              <a:rPr lang="ko-KR" sz="1800">
-                <a:latin typeface="맑은 고딕" charset="0"/>
-                <a:ea typeface="맑은 고딕" charset="0"/>
-              </a:rPr>
-              <a:t>스크립트를 생성하고 Main Camera</a:t>
-            </a:r>
-            <a:r>
-              <a:rPr lang="ko-KR" sz="1800">
-                <a:latin typeface="맑은 고딕" charset="0"/>
-                <a:ea typeface="맑은 고딕" charset="0"/>
-              </a:rPr>
-              <a:t> 오브젝트</a:t>
-            </a:r>
-            <a:r>
-              <a:rPr lang="ko-KR" sz="1800">
-                <a:latin typeface="맑은 고딕" charset="0"/>
-                <a:ea typeface="맑은 고딕" charset="0"/>
-              </a:rPr>
-              <a:t>에 넣어줍니다.</a:t>
+              <a:t>그다음으로 Picking 이라는 스크립트를 생성하고 Main Camera 오브젝트에 넣어줍니다.</a:t>
             </a:r>
             <a:endParaRPr lang="ko-KR" altLang="en-US" sz="1800">
               <a:latin typeface="맑은 고딕" charset="0"/>
@@ -8595,17 +8649,17 @@
       </p:sp>
       <p:pic>
         <p:nvPicPr>
-          <p:cNvPr id="1132" name="그림 3"/>
+          <p:cNvPr id="1132" name="그림 3" descr="C:/Users/Admin1/AppData/Roaming/PolarisOffice/ETemp/20872_11383232/fImage20162318467.png"/>
           <p:cNvPicPr>
             <a:picLocks noChangeAspect="1"/>
           </p:cNvPicPr>
           <p:nvPr/>
         </p:nvPicPr>
         <p:blipFill rotWithShape="1">
-          <a:blip r:embed="rId2" cstate="print">
+          <a:blip r:embed="rId2" cstate="hqprint">
             <a:extLst>
               <a:ext uri="{28A0092B-C50C-407E-A947-70E740481C1C}">
-                <a14:useLocalDpi xmlns:a14="http://schemas.microsoft.com/office/drawing/2010/main" val="0"/>
+                <a14:useLocalDpi xmlns:a14="http://schemas.microsoft.com/office/drawing/2010/main"/>
               </a:ext>
             </a:extLst>
           </a:blip>
@@ -8615,8 +8669,8 @@
         </p:blipFill>
         <p:spPr>
           <a:xfrm rot="0">
-            <a:off x="4613910" y="1540510"/>
-            <a:ext cx="756920" cy="800735"/>
+            <a:off x="4613910" y="1228725"/>
+            <a:ext cx="757555" cy="801370"/>
           </a:xfrm>
           <a:prstGeom prst="roundRect"/>
           <a:solidFill>
@@ -8626,17 +8680,17 @@
       </p:pic>
       <p:pic>
         <p:nvPicPr>
-          <p:cNvPr id="1138" name="그림 8" descr="C:/Users/Admin1/AppData/Roaming/PolarisOffice/ETemp/3276_19845488/fImage33821496334.png"/>
+          <p:cNvPr id="1138" name="그림 8" descr="C:/Users/Admin1/AppData/Roaming/PolarisOffice/ETemp/20872_11383232/fImage33821496334.png"/>
           <p:cNvPicPr>
             <a:picLocks noChangeAspect="1"/>
           </p:cNvPicPr>
           <p:nvPr/>
         </p:nvPicPr>
         <p:blipFill rotWithShape="1">
-          <a:blip r:embed="rId7" cstate="print">
+          <a:blip r:embed="rId7" cstate="hqprint">
             <a:extLst>
               <a:ext uri="{28A0092B-C50C-407E-A947-70E740481C1C}">
-                <a14:useLocalDpi xmlns:a14="http://schemas.microsoft.com/office/drawing/2010/main" val="0"/>
+                <a14:useLocalDpi xmlns:a14="http://schemas.microsoft.com/office/drawing/2010/main"/>
               </a:ext>
             </a:extLst>
           </a:blip>
@@ -8647,7 +8701,7 @@
         <p:spPr>
           <a:xfrm rot="0">
             <a:off x="1144270" y="1196975"/>
-            <a:ext cx="2962910" cy="1239520"/>
+            <a:ext cx="2963545" cy="890905"/>
           </a:xfrm>
           <a:prstGeom prst="roundRect"/>
           <a:solidFill>
@@ -8665,8 +8719,8 @@
         </p:nvCxnSpPr>
         <p:spPr>
           <a:xfrm rot="0" flipH="1" flipV="1">
-            <a:off x="3699510" y="1463040"/>
-            <a:ext cx="915035" cy="478155"/>
+            <a:off x="3714750" y="1333500"/>
+            <a:ext cx="899795" cy="295910"/>
           </a:xfrm>
           <a:prstGeom prst="straightConnector1"/>
           <a:ln w="19050" cap="flat" cmpd="sng">
@@ -8691,14 +8745,161 @@
       </p:cxnSp>
       <p:pic>
         <p:nvPicPr>
-          <p:cNvPr id="1139" name="그림 15" descr="C:/Users/Admin1/AppData/Roaming/PolarisOffice/ETemp/3276_19845488/fImage37762336500.png"/>
+          <p:cNvPr id="1139" name="그림 15" descr="C:/Users/Admin1/AppData/Roaming/PolarisOffice/ETemp/20872_11383232/fImage37762336500.png"/>
           <p:cNvPicPr>
             <a:picLocks noChangeAspect="1"/>
           </p:cNvPicPr>
           <p:nvPr/>
         </p:nvPicPr>
         <p:blipFill rotWithShape="1">
-          <a:blip r:embed="rId8" cstate="print">
+          <a:blip r:embed="rId8" cstate="hqprint">
+            <a:extLst>
+              <a:ext uri="{28A0092B-C50C-407E-A947-70E740481C1C}">
+                <a14:useLocalDpi xmlns:a14="http://schemas.microsoft.com/office/drawing/2010/main"/>
+              </a:ext>
+            </a:extLst>
+          </a:blip>
+          <a:stretch>
+            <a:fillRect/>
+          </a:stretch>
+        </p:blipFill>
+        <p:spPr>
+          <a:xfrm rot="0">
+            <a:off x="2577465" y="4149090"/>
+            <a:ext cx="2794000" cy="752475"/>
+          </a:xfrm>
+          <a:prstGeom prst="roundRect"/>
+          <a:solidFill>
+            <a:srgbClr val="EDEDED"/>
+          </a:solidFill>
+        </p:spPr>
+      </p:pic>
+      <p:pic>
+        <p:nvPicPr>
+          <p:cNvPr id="1140" name="그림 16" descr="C:/Users/Admin1/AppData/Roaming/PolarisOffice/ETemp/20872_11383232/fImage38712349169.png"/>
+          <p:cNvPicPr>
+            <a:picLocks noChangeAspect="1"/>
+          </p:cNvPicPr>
+          <p:nvPr/>
+        </p:nvPicPr>
+        <p:blipFill rotWithShape="1">
+          <a:blip r:embed="rId9" cstate="hqprint">
+            <a:extLst>
+              <a:ext uri="{28A0092B-C50C-407E-A947-70E740481C1C}">
+                <a14:useLocalDpi xmlns:a14="http://schemas.microsoft.com/office/drawing/2010/main"/>
+              </a:ext>
+            </a:extLst>
+          </a:blip>
+          <a:stretch>
+            <a:fillRect/>
+          </a:stretch>
+        </p:blipFill>
+        <p:spPr>
+          <a:xfrm rot="0">
+            <a:off x="2577465" y="3267710"/>
+            <a:ext cx="2794000" cy="759460"/>
+          </a:xfrm>
+          <a:prstGeom prst="roundRect"/>
+          <a:solidFill>
+            <a:srgbClr val="EDEDED"/>
+          </a:solidFill>
+        </p:spPr>
+      </p:pic>
+      <p:sp>
+        <p:nvSpPr>
+          <p:cNvPr id="1141" name="텍스트 상자 21"/>
+          <p:cNvSpPr txBox="1">
+            <a:spLocks/>
+          </p:cNvSpPr>
+          <p:nvPr/>
+        </p:nvSpPr>
+        <p:spPr>
+          <a:xfrm rot="0">
+            <a:off x="1143635" y="5001260"/>
+            <a:ext cx="4225290" cy="1231265"/>
+          </a:xfrm>
+          <a:prstGeom prst="rect"/>
+          <a:noFill/>
+          <a:ln w="0">
+            <a:noFill/>
+            <a:prstDash/>
+          </a:ln>
+        </p:spPr>
+        <p:txBody>
+          <a:bodyPr wrap="square" lIns="89535" tIns="46355" rIns="89535" bIns="46355" numCol="1" vert="horz" anchor="t">
+            <a:spAutoFit/>
+          </a:bodyPr>
+          <a:lstStyle/>
+          <a:p>
+            <a:pPr marL="0" indent="0" algn="l" latinLnBrk="0" hangingPunct="1">
+              <a:buFontTx/>
+              <a:buNone/>
+            </a:pPr>
+            <a:r>
+              <a:rPr lang="ko-KR" sz="2000" b="1">
+                <a:solidFill>
+                  <a:srgbClr val="0611F2"/>
+                </a:solidFill>
+                <a:latin typeface="맑은 고딕" charset="0"/>
+                <a:ea typeface="맑은 고딕" charset="0"/>
+              </a:rPr>
+              <a:t>11. </a:t>
+            </a:r>
+            <a:r>
+              <a:rPr lang="ko-KR" sz="1800">
+                <a:latin typeface="맑은 고딕" charset="0"/>
+                <a:ea typeface="맑은 고딕" charset="0"/>
+              </a:rPr>
+              <a:t>그리고 Saving 버튼에 있는 텍스트에는 1000원 (적금)을 입력하고 Withdrawal 버튼에 있는 텍스트에는 1000원 (출금)을 입력합니다.</a:t>
+            </a:r>
+            <a:endParaRPr lang="ko-KR" altLang="en-US" sz="1800">
+              <a:latin typeface="맑은 고딕" charset="0"/>
+              <a:ea typeface="맑은 고딕" charset="0"/>
+            </a:endParaRPr>
+          </a:p>
+        </p:txBody>
+      </p:sp>
+      <p:pic>
+        <p:nvPicPr>
+          <p:cNvPr id="1142" name="그림 22" descr="C:/Users/Admin1/AppData/Roaming/PolarisOffice/ETemp/20872_11383232/fImage54872365724.png"/>
+          <p:cNvPicPr>
+            <a:picLocks noChangeAspect="1"/>
+          </p:cNvPicPr>
+          <p:nvPr/>
+        </p:nvPicPr>
+        <p:blipFill rotWithShape="1">
+          <a:blip r:embed="rId10" cstate="hqprint">
+            <a:extLst>
+              <a:ext uri="{28A0092B-C50C-407E-A947-70E740481C1C}">
+                <a14:useLocalDpi xmlns:a14="http://schemas.microsoft.com/office/drawing/2010/main"/>
+              </a:ext>
+            </a:extLst>
+          </a:blip>
+          <a:stretch>
+            <a:fillRect/>
+          </a:stretch>
+        </p:blipFill>
+        <p:spPr>
+          <a:xfrm rot="0">
+            <a:off x="1146810" y="3260725"/>
+            <a:ext cx="1207135" cy="1649730"/>
+          </a:xfrm>
+          <a:prstGeom prst="roundRect"/>
+          <a:solidFill>
+            <a:srgbClr val="EDEDED"/>
+          </a:solidFill>
+        </p:spPr>
+      </p:pic>
+      <p:pic>
+        <p:nvPicPr>
+          <p:cNvPr id="1143" name="그림 21" descr="C:/Users/Admin1/AppData/Roaming/PolarisOffice/ETemp/20872_11383232/fImage1866022541.png"/>
+          <p:cNvPicPr>
+            <a:picLocks noChangeAspect="1"/>
+          </p:cNvPicPr>
+          <p:nvPr/>
+        </p:nvPicPr>
+        <p:blipFill rotWithShape="1">
+          <a:blip r:embed="rId11" cstate="print">
             <a:extLst>
               <a:ext uri="{28A0092B-C50C-407E-A947-70E740481C1C}">
                 <a14:useLocalDpi xmlns:a14="http://schemas.microsoft.com/office/drawing/2010/main" val="0"/>
@@ -8711,189 +8912,8 @@
         </p:blipFill>
         <p:spPr>
           <a:xfrm rot="0">
-            <a:off x="2577465" y="4443730"/>
-            <a:ext cx="2793365" cy="677545"/>
-          </a:xfrm>
-          <a:prstGeom prst="roundRect"/>
-          <a:solidFill>
-            <a:srgbClr val="EDEDED"/>
-          </a:solidFill>
-        </p:spPr>
-      </p:pic>
-      <p:pic>
-        <p:nvPicPr>
-          <p:cNvPr id="1140" name="그림 16" descr="C:/Users/Admin1/AppData/Roaming/PolarisOffice/ETemp/3276_19845488/fImage38712349169.png"/>
-          <p:cNvPicPr>
-            <a:picLocks noChangeAspect="1"/>
-          </p:cNvPicPr>
-          <p:nvPr/>
-        </p:nvPicPr>
-        <p:blipFill rotWithShape="1">
-          <a:blip r:embed="rId9" cstate="print">
-            <a:extLst>
-              <a:ext uri="{28A0092B-C50C-407E-A947-70E740481C1C}">
-                <a14:useLocalDpi xmlns:a14="http://schemas.microsoft.com/office/drawing/2010/main" val="0"/>
-              </a:ext>
-            </a:extLst>
-          </a:blip>
-          <a:stretch>
-            <a:fillRect/>
-          </a:stretch>
-        </p:blipFill>
-        <p:spPr>
-          <a:xfrm rot="0">
-            <a:off x="2577465" y="3639820"/>
-            <a:ext cx="2793365" cy="658495"/>
-          </a:xfrm>
-          <a:prstGeom prst="roundRect"/>
-          <a:solidFill>
-            <a:srgbClr val="EDEDED"/>
-          </a:solidFill>
-        </p:spPr>
-      </p:pic>
-      <p:sp>
-        <p:nvSpPr>
-          <p:cNvPr id="1141" name="텍스트 상자 21"/>
-          <p:cNvSpPr txBox="1">
-            <a:spLocks/>
-          </p:cNvSpPr>
-          <p:nvPr/>
-        </p:nvSpPr>
-        <p:spPr>
-          <a:xfrm rot="0">
-            <a:off x="1143635" y="5217795"/>
-            <a:ext cx="4224655" cy="1231265"/>
-          </a:xfrm>
-          <a:prstGeom prst="rect"/>
-          <a:noFill/>
-          <a:ln w="0">
-            <a:noFill/>
-            <a:prstDash/>
-          </a:ln>
-        </p:spPr>
-        <p:txBody>
-          <a:bodyPr wrap="square" lIns="89535" tIns="46355" rIns="89535" bIns="46355" numCol="1" vert="horz" anchor="t">
-            <a:spAutoFit/>
-          </a:bodyPr>
-          <a:lstStyle/>
-          <a:p>
-            <a:pPr marL="0" indent="0" algn="l" latinLnBrk="0" hangingPunct="1">
-              <a:buFontTx/>
-              <a:buNone/>
-            </a:pPr>
-            <a:r>
-              <a:rPr lang="ko-KR" sz="2000" b="1">
-                <a:solidFill>
-                  <a:srgbClr val="0611F2"/>
-                </a:solidFill>
-                <a:latin typeface="맑은 고딕" charset="0"/>
-                <a:ea typeface="맑은 고딕" charset="0"/>
-              </a:rPr>
-              <a:t>1</a:t>
-            </a:r>
-            <a:r>
-              <a:rPr lang="ko-KR" sz="2000" b="1">
-                <a:solidFill>
-                  <a:srgbClr val="0611F2"/>
-                </a:solidFill>
-                <a:latin typeface="맑은 고딕" charset="0"/>
-                <a:ea typeface="맑은 고딕" charset="0"/>
-              </a:rPr>
-              <a:t>1</a:t>
-            </a:r>
-            <a:r>
-              <a:rPr lang="ko-KR" sz="2000" b="1">
-                <a:solidFill>
-                  <a:srgbClr val="0611F2"/>
-                </a:solidFill>
-                <a:latin typeface="맑은 고딕" charset="0"/>
-                <a:ea typeface="맑은 고딕" charset="0"/>
-              </a:rPr>
-              <a:t>. </a:t>
-            </a:r>
-            <a:r>
-              <a:rPr lang="ko-KR" sz="1800">
-                <a:latin typeface="맑은 고딕" charset="0"/>
-                <a:ea typeface="맑은 고딕" charset="0"/>
-              </a:rPr>
-              <a:t>그리고 </a:t>
-            </a:r>
-            <a:r>
-              <a:rPr lang="ko-KR" sz="1800">
-                <a:latin typeface="맑은 고딕" charset="0"/>
-                <a:ea typeface="맑은 고딕" charset="0"/>
-              </a:rPr>
-              <a:t>Saving 버튼</a:t>
-            </a:r>
-            <a:r>
-              <a:rPr lang="ko-KR" sz="1800">
-                <a:latin typeface="맑은 고딕" charset="0"/>
-                <a:ea typeface="맑은 고딕" charset="0"/>
-              </a:rPr>
-              <a:t>에 있는 텍스트에는 1000원 (적금)을 입력하고 Withdrawal 버튼에 있는 텍스트에는 1000원 (출금)을 입력합니다.</a:t>
-            </a:r>
-            <a:endParaRPr lang="ko-KR" altLang="en-US" sz="1800">
-              <a:latin typeface="맑은 고딕" charset="0"/>
-              <a:ea typeface="맑은 고딕" charset="0"/>
-            </a:endParaRPr>
-          </a:p>
-        </p:txBody>
-      </p:sp>
-      <p:pic>
-        <p:nvPicPr>
-          <p:cNvPr id="1142" name="그림 22" descr="C:/Users/Admin1/AppData/Roaming/PolarisOffice/ETemp/3276_19845488/fImage54872365724.png"/>
-          <p:cNvPicPr>
-            <a:picLocks noChangeAspect="1"/>
-          </p:cNvPicPr>
-          <p:nvPr/>
-        </p:nvPicPr>
-        <p:blipFill rotWithShape="1">
-          <a:blip r:embed="rId10" cstate="print">
-            <a:extLst>
-              <a:ext uri="{28A0092B-C50C-407E-A947-70E740481C1C}">
-                <a14:useLocalDpi xmlns:a14="http://schemas.microsoft.com/office/drawing/2010/main" val="0"/>
-              </a:ext>
-            </a:extLst>
-          </a:blip>
-          <a:stretch>
-            <a:fillRect/>
-          </a:stretch>
-        </p:blipFill>
-        <p:spPr>
-          <a:xfrm rot="0">
-            <a:off x="1146810" y="3632835"/>
-            <a:ext cx="1206500" cy="1480185"/>
-          </a:xfrm>
-          <a:prstGeom prst="roundRect"/>
-          <a:solidFill>
-            <a:srgbClr val="EDEDED"/>
-          </a:solidFill>
-        </p:spPr>
-      </p:pic>
-      <p:pic>
-        <p:nvPicPr>
-          <p:cNvPr id="1143" name="그림 26" descr="C:/Users/Admin1/AppData/Roaming/PolarisOffice/ETemp/3276_19845488/fImage125112366500.png"/>
-          <p:cNvPicPr>
-            <a:picLocks noChangeAspect="1"/>
-          </p:cNvPicPr>
-          <p:nvPr/>
-        </p:nvPicPr>
-        <p:blipFill rotWithShape="1">
-          <a:blip r:embed="rId5" cstate="hqprint">
-            <a:extLst>
-              <a:ext uri="{28A0092B-C50C-407E-A947-70E740481C1C}">
-                <a14:useLocalDpi xmlns:a14="http://schemas.microsoft.com/office/drawing/2010/main"/>
-              </a:ext>
-            </a:extLst>
-          </a:blip>
-          <a:stretch>
-            <a:fillRect/>
-          </a:stretch>
-        </p:blipFill>
-        <p:spPr>
-          <a:xfrm rot="0">
-            <a:off x="6829425" y="1212215"/>
-            <a:ext cx="4163060" cy="3303270"/>
+            <a:off x="6814820" y="1186180"/>
+            <a:ext cx="4373880" cy="3204845"/>
           </a:xfrm>
           <a:prstGeom prst="rect"/>
           <a:noFill/>
@@ -9278,6 +9298,509 @@
 </file>
 
 <file path=ppt/slides/slide7.xml><?xml version="1.0" encoding="utf-8"?>
+<p:sld xmlns:a="http://schemas.openxmlformats.org/drawingml/2006/main" xmlns:r="http://schemas.openxmlformats.org/officeDocument/2006/relationships" xmlns:p="http://schemas.openxmlformats.org/presentationml/2006/main" xmlns:p14="http://schemas.microsoft.com/office/powerpoint/2010/main">
+  <p:cSld>
+    <p:spTree>
+      <p:nvGrpSpPr>
+        <p:cNvPr id="1" name=""/>
+        <p:cNvGrpSpPr/>
+        <p:nvPr/>
+      </p:nvGrpSpPr>
+      <p:grpSpPr>
+        <a:xfrm>
+          <a:off x="0" y="0"/>
+          <a:ext cx="0" cy="0"/>
+          <a:chOff x="0" y="0"/>
+          <a:chExt cx="0" cy="0"/>
+        </a:xfrm>
+      </p:grpSpPr>
+      <p:sp>
+        <p:nvSpPr>
+          <p:cNvPr id="1031" name="Rect 0"/>
+          <p:cNvSpPr txBox="1">
+            <a:spLocks/>
+          </p:cNvSpPr>
+          <p:nvPr/>
+        </p:nvSpPr>
+        <p:spPr>
+          <a:xfrm rot="0">
+            <a:off x="4342130" y="327660"/>
+            <a:ext cx="3507105" cy="554990"/>
+          </a:xfrm>
+          <a:prstGeom prst="rect"/>
+          <a:noFill/>
+          <a:ln w="0">
+            <a:noFill/>
+            <a:prstDash/>
+          </a:ln>
+        </p:spPr>
+        <p:txBody>
+          <a:bodyPr wrap="square" lIns="89535" tIns="46355" rIns="89535" bIns="46355" numCol="1" vert="horz" anchor="t">
+            <a:spAutoFit/>
+          </a:bodyPr>
+          <a:lstStyle/>
+          <a:p>
+            <a:pPr marL="0" indent="0" algn="l" latinLnBrk="0">
+              <a:buFontTx/>
+              <a:buNone/>
+            </a:pPr>
+            <a:r>
+              <a:rPr lang="ko-KR" altLang="en-US" sz="3000" b="1">
+                <a:solidFill>
+                  <a:schemeClr val="tx1"/>
+                </a:solidFill>
+                <a:latin typeface="맑은 고딕" charset="0"/>
+                <a:ea typeface="맑은 고딕" charset="0"/>
+              </a:rPr>
+              <a:t>다섯</a:t>
+            </a:r>
+            <a:r>
+              <a:rPr lang="ko-KR" altLang="en-US" sz="3000" b="1">
+                <a:solidFill>
+                  <a:schemeClr val="tx1"/>
+                </a:solidFill>
+                <a:latin typeface="맑은 고딕" charset="0"/>
+                <a:ea typeface="맑은 고딕" charset="0"/>
+              </a:rPr>
+              <a:t> 번째 튜토리얼</a:t>
+            </a:r>
+            <a:endParaRPr lang="ko-KR" altLang="en-US" sz="3000" b="1">
+              <a:solidFill>
+                <a:schemeClr val="tx1"/>
+              </a:solidFill>
+              <a:latin typeface="맑은 고딕" charset="0"/>
+              <a:ea typeface="맑은 고딕" charset="0"/>
+            </a:endParaRPr>
+          </a:p>
+        </p:txBody>
+      </p:sp>
+      <p:sp>
+        <p:nvSpPr>
+          <p:cNvPr id="1141" name="텍스트 상자 37"/>
+          <p:cNvSpPr txBox="1">
+            <a:spLocks/>
+          </p:cNvSpPr>
+          <p:nvPr/>
+        </p:nvSpPr>
+        <p:spPr>
+          <a:xfrm rot="0">
+            <a:off x="6814820" y="2553335"/>
+            <a:ext cx="4215765" cy="585470"/>
+          </a:xfrm>
+          <a:prstGeom prst="rect"/>
+          <a:noFill/>
+        </p:spPr>
+        <p:txBody>
+          <a:bodyPr wrap="square" lIns="0" tIns="0" rIns="0" bIns="0" numCol="1" vert="horz" anchor="t">
+            <a:noAutofit/>
+          </a:bodyPr>
+          <a:lstStyle/>
+          <a:p>
+            <a:pPr marL="0" indent="0" algn="l" latinLnBrk="0" hangingPunct="1">
+              <a:buFontTx/>
+              <a:buNone/>
+            </a:pPr>
+            <a:r>
+              <a:rPr lang="ko-KR" sz="2000" b="1">
+                <a:solidFill>
+                  <a:srgbClr val="0611F2"/>
+                </a:solidFill>
+                <a:latin typeface="맑은 고딕" charset="0"/>
+                <a:ea typeface="맑은 고딕" charset="0"/>
+              </a:rPr>
+              <a:t>1</a:t>
+            </a:r>
+            <a:r>
+              <a:rPr lang="ko-KR" sz="2000" b="1">
+                <a:solidFill>
+                  <a:srgbClr val="0611F2"/>
+                </a:solidFill>
+                <a:latin typeface="맑은 고딕" charset="0"/>
+                <a:ea typeface="맑은 고딕" charset="0"/>
+              </a:rPr>
+              <a:t>3</a:t>
+            </a:r>
+            <a:r>
+              <a:rPr lang="ko-KR" sz="2000" b="1">
+                <a:solidFill>
+                  <a:srgbClr val="0611F2"/>
+                </a:solidFill>
+                <a:latin typeface="맑은 고딕" charset="0"/>
+                <a:ea typeface="맑은 고딕" charset="0"/>
+              </a:rPr>
+              <a:t>. </a:t>
+            </a:r>
+            <a:r>
+              <a:rPr lang="ko-KR" sz="1800">
+                <a:latin typeface="맑은 고딕" charset="0"/>
+                <a:ea typeface="맑은 고딕" charset="0"/>
+              </a:rPr>
+              <a:t>이제 광선과 충돌이 되면 Project 폴더에 있는 Resources 폴더에 Ice 머티리얼을 동적으로 불러옵니다.</a:t>
+            </a:r>
+            <a:endParaRPr lang="ko-KR" altLang="en-US" sz="1800">
+              <a:latin typeface="맑은 고딕" charset="0"/>
+              <a:ea typeface="맑은 고딕" charset="0"/>
+            </a:endParaRPr>
+          </a:p>
+          <a:p>
+            <a:pPr marL="0" indent="0" algn="l" latinLnBrk="0" hangingPunct="1">
+              <a:buFontTx/>
+              <a:buNone/>
+            </a:pPr>
+            <a:endParaRPr lang="ko-KR" altLang="en-US" sz="1800">
+              <a:latin typeface="맑은 고딕" charset="0"/>
+              <a:ea typeface="맑은 고딕" charset="0"/>
+            </a:endParaRPr>
+          </a:p>
+        </p:txBody>
+      </p:sp>
+      <p:sp>
+        <p:nvSpPr>
+          <p:cNvPr id="1143" name="텍스트 상자 23"/>
+          <p:cNvSpPr txBox="1">
+            <a:spLocks/>
+          </p:cNvSpPr>
+          <p:nvPr/>
+        </p:nvSpPr>
+        <p:spPr>
+          <a:xfrm rot="0">
+            <a:off x="1322070" y="1201420"/>
+            <a:ext cx="4038600" cy="1200785"/>
+          </a:xfrm>
+          <a:prstGeom prst="rect"/>
+          <a:noFill/>
+          <a:ln w="0">
+            <a:noFill/>
+            <a:prstDash/>
+          </a:ln>
+        </p:spPr>
+        <p:txBody>
+          <a:bodyPr wrap="square" lIns="89535" tIns="46355" rIns="89535" bIns="46355" vert="horz" anchor="t">
+            <a:spAutoFit/>
+          </a:bodyPr>
+          <a:lstStyle/>
+          <a:p>
+            <a:pPr marL="0" indent="0" rtl="0" algn="l" defTabSz="914400" eaLnBrk="1" latinLnBrk="0" hangingPunct="1">
+              <a:buFontTx/>
+              <a:buNone/>
+            </a:pPr>
+            <a:r>
+              <a:rPr sz="1800">
+                <a:latin typeface="맑은 고딕" charset="0"/>
+                <a:ea typeface="맑은 고딕" charset="0"/>
+              </a:rPr>
+              <a:t>Resources.Load( )</a:t>
+            </a:r>
+            <a:r>
+              <a:rPr sz="1800">
+                <a:latin typeface="맑은 고딕" charset="0"/>
+                <a:ea typeface="맑은 고딕" charset="0"/>
+              </a:rPr>
+              <a:t> </a:t>
+            </a:r>
+            <a:r>
+              <a:rPr sz="1800">
+                <a:latin typeface="맑은 고딕" charset="0"/>
+                <a:ea typeface="맑은 고딕" charset="0"/>
+              </a:rPr>
+              <a:t>함수는 리소스 폴더 내부에 있는 여러 에셋 데이터들을 실행 시간에 불러오는 함수입니다.</a:t>
+            </a:r>
+            <a:endParaRPr lang="ko-KR" altLang="en-US" sz="1800">
+              <a:latin typeface="맑은 고딕" charset="0"/>
+              <a:ea typeface="맑은 고딕" charset="0"/>
+            </a:endParaRPr>
+          </a:p>
+        </p:txBody>
+      </p:sp>
+      <p:sp>
+        <p:nvSpPr>
+          <p:cNvPr id="1145" name="텍스트 상자 25"/>
+          <p:cNvSpPr txBox="1">
+            <a:spLocks/>
+          </p:cNvSpPr>
+          <p:nvPr/>
+        </p:nvSpPr>
+        <p:spPr>
+          <a:xfrm rot="0">
+            <a:off x="1327150" y="5257800"/>
+            <a:ext cx="4043680" cy="923925"/>
+          </a:xfrm>
+          <a:prstGeom prst="rect"/>
+          <a:noFill/>
+          <a:ln w="0">
+            <a:noFill/>
+            <a:prstDash/>
+          </a:ln>
+        </p:spPr>
+        <p:txBody>
+          <a:bodyPr wrap="square" lIns="89535" tIns="46355" rIns="89535" bIns="46355" vert="horz" anchor="t">
+            <a:spAutoFit/>
+          </a:bodyPr>
+          <a:lstStyle/>
+          <a:p>
+            <a:pPr marL="0" indent="0" rtl="0" algn="l" defTabSz="914400" eaLnBrk="1" latinLnBrk="0" hangingPunct="1">
+              <a:buFontTx/>
+              <a:buNone/>
+            </a:pPr>
+            <a:r>
+              <a:rPr sz="1800">
+                <a:latin typeface="맑은 고딕" charset="0"/>
+                <a:ea typeface="맑은 고딕" charset="0"/>
+              </a:rPr>
+              <a:t>Resources라는 특수 폴더에 에셋을 보관해야지만, 실행시간에 에셋을 불러올 수 있습니다.</a:t>
+            </a:r>
+            <a:endParaRPr lang="ko-KR" altLang="en-US" sz="1800">
+              <a:latin typeface="맑은 고딕" charset="0"/>
+              <a:ea typeface="맑은 고딕" charset="0"/>
+            </a:endParaRPr>
+          </a:p>
+        </p:txBody>
+      </p:sp>
+      <p:pic>
+        <p:nvPicPr>
+          <p:cNvPr id="1146" name="그림 26" descr="C:/Users/Admin1/AppData/Roaming/PolarisOffice/ETemp/20872_11383232/fImage5685822298467.png"/>
+          <p:cNvPicPr>
+            <a:picLocks noChangeAspect="1"/>
+          </p:cNvPicPr>
+          <p:nvPr/>
+        </p:nvPicPr>
+        <p:blipFill rotWithShape="1">
+          <a:blip r:embed="rId6" cstate="print">
+            <a:extLst>
+              <a:ext uri="{28A0092B-C50C-407E-A947-70E740481C1C}">
+                <a14:useLocalDpi xmlns:a14="http://schemas.microsoft.com/office/drawing/2010/main" val="0"/>
+              </a:ext>
+            </a:extLst>
+          </a:blip>
+          <a:stretch>
+            <a:fillRect/>
+          </a:stretch>
+        </p:blipFill>
+        <p:spPr>
+          <a:xfrm rot="0">
+            <a:off x="3009900" y="3021965"/>
+            <a:ext cx="878840" cy="762635"/>
+          </a:xfrm>
+          <a:prstGeom prst="rect"/>
+          <a:noFill/>
+        </p:spPr>
+      </p:pic>
+      <p:pic>
+        <p:nvPicPr>
+          <p:cNvPr id="1148" name="그림 31" descr="C:/Users/Admin1/AppData/Roaming/PolarisOffice/ETemp/20872_11383232/fImage100442346334.png"/>
+          <p:cNvPicPr>
+            <a:picLocks noChangeAspect="1"/>
+          </p:cNvPicPr>
+          <p:nvPr/>
+        </p:nvPicPr>
+        <p:blipFill rotWithShape="1">
+          <a:blip r:embed="rId7" cstate="print">
+            <a:extLst>
+              <a:ext uri="{28A0092B-C50C-407E-A947-70E740481C1C}">
+                <a14:useLocalDpi xmlns:a14="http://schemas.microsoft.com/office/drawing/2010/main" val="0"/>
+              </a:ext>
+            </a:extLst>
+          </a:blip>
+          <a:stretch>
+            <a:fillRect/>
+          </a:stretch>
+        </p:blipFill>
+        <p:spPr>
+          <a:xfrm rot="0">
+            <a:off x="6804025" y="1209675"/>
+            <a:ext cx="4228465" cy="1096010"/>
+          </a:xfrm>
+          <a:prstGeom prst="roundRect"/>
+          <a:solidFill>
+            <a:srgbClr val="EDEDED"/>
+          </a:solidFill>
+        </p:spPr>
+      </p:pic>
+      <p:pic>
+        <p:nvPicPr>
+          <p:cNvPr id="1149" name="그림 34" descr="C:/Users/Admin1/AppData/Roaming/PolarisOffice/ETemp/20872_11383232/fImage2392992356500.png"/>
+          <p:cNvPicPr>
+            <a:picLocks noChangeAspect="1"/>
+          </p:cNvPicPr>
+          <p:nvPr/>
+        </p:nvPicPr>
+        <p:blipFill rotWithShape="1">
+          <a:blip r:embed="rId8" cstate="print">
+            <a:extLst>
+              <a:ext uri="{28A0092B-C50C-407E-A947-70E740481C1C}">
+                <a14:useLocalDpi xmlns:a14="http://schemas.microsoft.com/office/drawing/2010/main" val="0"/>
+              </a:ext>
+            </a:extLst>
+          </a:blip>
+          <a:stretch>
+            <a:fillRect/>
+          </a:stretch>
+        </p:blipFill>
+        <p:spPr>
+          <a:xfrm rot="0">
+            <a:off x="1316355" y="2597785"/>
+            <a:ext cx="4044315" cy="2451100"/>
+          </a:xfrm>
+          <a:prstGeom prst="rect"/>
+          <a:noFill/>
+        </p:spPr>
+      </p:pic>
+      <p:pic>
+        <p:nvPicPr>
+          <p:cNvPr id="1150" name="그림 35" descr="C:/Users/Admin1/AppData/Roaming/PolarisOffice/ETemp/20872_11383232/fImage152002566500.png"/>
+          <p:cNvPicPr>
+            <a:picLocks noChangeAspect="1"/>
+          </p:cNvPicPr>
+          <p:nvPr/>
+        </p:nvPicPr>
+        <p:blipFill rotWithShape="1">
+          <a:blip r:embed="rId3" cstate="hqprint">
+            <a:extLst>
+              <a:ext uri="{28A0092B-C50C-407E-A947-70E740481C1C}">
+                <a14:useLocalDpi xmlns:a14="http://schemas.microsoft.com/office/drawing/2010/main"/>
+              </a:ext>
+            </a:extLst>
+          </a:blip>
+          <a:stretch>
+            <a:fillRect/>
+          </a:stretch>
+        </p:blipFill>
+        <p:spPr>
+          <a:xfrm rot="0">
+            <a:off x="6817995" y="3583305"/>
+            <a:ext cx="2526030" cy="1456690"/>
+          </a:xfrm>
+          <a:prstGeom prst="roundRect"/>
+          <a:solidFill>
+            <a:srgbClr val="EDEDED"/>
+          </a:solidFill>
+        </p:spPr>
+      </p:pic>
+      <p:sp>
+        <p:nvSpPr>
+          <p:cNvPr id="1151" name="텍스트 상자 36"/>
+          <p:cNvSpPr txBox="1">
+            <a:spLocks/>
+          </p:cNvSpPr>
+          <p:nvPr/>
+        </p:nvSpPr>
+        <p:spPr>
+          <a:xfrm rot="0">
+            <a:off x="6818630" y="5203190"/>
+            <a:ext cx="4041140" cy="979805"/>
+          </a:xfrm>
+          <a:prstGeom prst="rect"/>
+          <a:noFill/>
+        </p:spPr>
+        <p:txBody>
+          <a:bodyPr wrap="square" lIns="0" tIns="0" rIns="0" bIns="0" numCol="1" vert="horz" anchor="t">
+            <a:noAutofit/>
+          </a:bodyPr>
+          <a:lstStyle/>
+          <a:p>
+            <a:pPr marL="0" indent="0" algn="l" latinLnBrk="0" hangingPunct="1">
+              <a:buFontTx/>
+              <a:buNone/>
+            </a:pPr>
+            <a:r>
+              <a:rPr lang="ko-KR" sz="2000" b="1">
+                <a:solidFill>
+                  <a:srgbClr val="0611F2"/>
+                </a:solidFill>
+                <a:latin typeface="맑은 고딕" charset="0"/>
+                <a:ea typeface="맑은 고딕" charset="0"/>
+              </a:rPr>
+              <a:t>1</a:t>
+            </a:r>
+            <a:r>
+              <a:rPr lang="ko-KR" sz="2000" b="1">
+                <a:solidFill>
+                  <a:srgbClr val="0611F2"/>
+                </a:solidFill>
+                <a:latin typeface="맑은 고딕" charset="0"/>
+                <a:ea typeface="맑은 고딕" charset="0"/>
+              </a:rPr>
+              <a:t>4</a:t>
+            </a:r>
+            <a:r>
+              <a:rPr lang="ko-KR" sz="2000" b="1">
+                <a:solidFill>
+                  <a:srgbClr val="0611F2"/>
+                </a:solidFill>
+                <a:latin typeface="맑은 고딕" charset="0"/>
+                <a:ea typeface="맑은 고딕" charset="0"/>
+              </a:rPr>
+              <a:t>. </a:t>
+            </a:r>
+            <a:r>
+              <a:rPr lang="ko-KR" sz="1800">
+                <a:latin typeface="맑은 고딕" charset="0"/>
+                <a:ea typeface="맑은 고딕" charset="0"/>
+              </a:rPr>
+              <a:t>그리고 3D Object 에서 Cube를 생성한 다음 Bot으로 이름을 정의합니다.</a:t>
+            </a:r>
+            <a:endParaRPr lang="ko-KR" altLang="en-US" sz="1800">
+              <a:latin typeface="맑은 고딕" charset="0"/>
+              <a:ea typeface="맑은 고딕" charset="0"/>
+            </a:endParaRPr>
+          </a:p>
+        </p:txBody>
+      </p:sp>
+      <p:pic>
+        <p:nvPicPr>
+          <p:cNvPr id="1152" name="그림 37" descr="C:/Users/Admin1/AppData/Roaming/PolarisOffice/ETemp/20872_11383232/fImage65262451478.png"/>
+          <p:cNvPicPr>
+            <a:picLocks noChangeAspect="1"/>
+          </p:cNvPicPr>
+          <p:nvPr/>
+        </p:nvPicPr>
+        <p:blipFill rotWithShape="1">
+          <a:blip r:embed="rId4" cstate="hqprint">
+            <a:extLst>
+              <a:ext uri="{28A0092B-C50C-407E-A947-70E740481C1C}">
+                <a14:useLocalDpi xmlns:a14="http://schemas.microsoft.com/office/drawing/2010/main"/>
+              </a:ext>
+            </a:extLst>
+          </a:blip>
+          <a:stretch>
+            <a:fillRect/>
+          </a:stretch>
+        </p:blipFill>
+        <p:spPr>
+          <a:xfrm rot="0">
+            <a:off x="9568815" y="3783965"/>
+            <a:ext cx="1299845" cy="1057275"/>
+          </a:xfrm>
+          <a:prstGeom prst="roundRect"/>
+          <a:solidFill>
+            <a:srgbClr val="EDEDED"/>
+          </a:solidFill>
+        </p:spPr>
+      </p:pic>
+    </p:spTree>
+  </p:cSld>
+  <p:clrMapOvr>
+    <a:masterClrMapping/>
+  </p:clrMapOvr>
+  <mc:AlternateContent xmlns:mc="http://schemas.openxmlformats.org/markup-compatibility/2006">
+    <mc:Choice xmlns:p14="http://schemas.microsoft.com/office/powerpoint/2010/main" Requires="p14">
+      <p:transition spd="slow" p14:dur="2000"/>
+    </mc:Choice>
+    <mc:Fallback>
+      <p:transition spd="slow"/>
+    </mc:Fallback>
+  </mc:AlternateContent>
+  <p:timing>
+    <p:tnLst>
+      <p:par>
+        <p:cTn id="1" dur="indefinite" restart="never" nodeType="tmRoot"/>
+      </p:par>
+    </p:tnLst>
+  </p:timing>
+</p:sld>
+</file>
+
+<file path=ppt/slides/slide8.xml><?xml version="1.0" encoding="utf-8"?>
 <p:sld xmlns:a="http://schemas.openxmlformats.org/drawingml/2006/main" xmlns:r="http://schemas.openxmlformats.org/officeDocument/2006/relationships" xmlns:p="http://schemas.openxmlformats.org/presentationml/2006/main">
   <p:cSld>
     <p:spTree>
@@ -9296,7 +9819,7 @@
       </p:grpSpPr>
       <p:sp>
         <p:nvSpPr>
-          <p:cNvPr id="1031" name="Rect 0"/>
+          <p:cNvPr id="5" name="텍스트 상자 5"/>
           <p:cNvSpPr txBox="1">
             <a:spLocks/>
           </p:cNvSpPr>
@@ -9305,7 +9828,7 @@
         <p:spPr>
           <a:xfrm rot="0">
             <a:off x="4342130" y="327660"/>
-            <a:ext cx="3507105" cy="554990"/>
+            <a:ext cx="3507740" cy="554990"/>
           </a:xfrm>
           <a:prstGeom prst="rect"/>
           <a:noFill/>
@@ -9332,7 +9855,7 @@
                 <a:latin typeface="맑은 고딕" charset="0"/>
                 <a:ea typeface="맑은 고딕" charset="0"/>
               </a:rPr>
-              <a:t>다섯</a:t>
+              <a:t>여</a:t>
             </a:r>
             <a:r>
               <a:rPr lang="ko-KR" altLang="en-US" sz="3000" b="1">
@@ -9342,7 +9865,7 @@
                 <a:latin typeface="맑은 고딕" charset="0"/>
                 <a:ea typeface="맑은 고딕" charset="0"/>
               </a:rPr>
-              <a:t> 번째 튜토리얼</a:t>
+              <a:t>섯 번째 튜토리얼</a:t>
             </a:r>
             <a:endParaRPr lang="ko-KR" altLang="en-US" sz="3000" b="1">
               <a:solidFill>
@@ -9356,7 +9879,7 @@
       </p:sp>
       <p:sp>
         <p:nvSpPr>
-          <p:cNvPr id="1116" name="Rect 0"/>
+          <p:cNvPr id="7" name="텍스트 상자 29"/>
           <p:cNvSpPr txBox="1">
             <a:spLocks/>
           </p:cNvSpPr>
@@ -9364,19 +9887,15 @@
         </p:nvSpPr>
         <p:spPr>
           <a:xfrm rot="0">
-            <a:off x="1294765" y="4765040"/>
-            <a:ext cx="4068445" cy="954405"/>
+            <a:off x="1325245" y="2674620"/>
+            <a:ext cx="4053205" cy="711835"/>
           </a:xfrm>
           <a:prstGeom prst="rect"/>
           <a:noFill/>
-          <a:ln w="0">
-            <a:noFill/>
-            <a:prstDash/>
-          </a:ln>
-        </p:spPr>
-        <p:txBody>
-          <a:bodyPr wrap="square" lIns="89535" tIns="46355" rIns="89535" bIns="46355" numCol="1" vert="horz" anchor="t">
-            <a:spAutoFit/>
+        </p:spPr>
+        <p:txBody>
+          <a:bodyPr wrap="square" lIns="0" tIns="0" rIns="0" bIns="0" numCol="1" vert="horz" anchor="t">
+            <a:noAutofit/>
           </a:bodyPr>
           <a:lstStyle/>
           <a:p>
@@ -9392,7 +9911,7 @@
                 <a:latin typeface="맑은 고딕" charset="0"/>
                 <a:ea typeface="맑은 고딕" charset="0"/>
               </a:rPr>
-              <a:t>1</a:t>
+              <a:t>15</a:t>
             </a:r>
             <a:r>
               <a:rPr lang="ko-KR" sz="2000" b="1">
@@ -9402,16 +9921,6 @@
                 <a:latin typeface="맑은 고딕" charset="0"/>
                 <a:ea typeface="맑은 고딕" charset="0"/>
               </a:rPr>
-              <a:t>3</a:t>
-            </a:r>
-            <a:r>
-              <a:rPr lang="ko-KR" sz="2000" b="1">
-                <a:solidFill>
-                  <a:srgbClr val="0611F2"/>
-                </a:solidFill>
-                <a:latin typeface="맑은 고딕" charset="0"/>
-                <a:ea typeface="맑은 고딕" charset="0"/>
-              </a:rPr>
               <a:t>. </a:t>
             </a:r>
             <a:r>
@@ -9419,42 +9928,14 @@
                 <a:latin typeface="맑은 고딕" charset="0"/>
                 <a:ea typeface="맑은 고딕" charset="0"/>
               </a:rPr>
-              <a:t>그</a:t>
+              <a:t>그리고 </a:t>
             </a:r>
             <a:r>
               <a:rPr lang="ko-KR" sz="1800">
                 <a:latin typeface="맑은 고딕" charset="0"/>
                 <a:ea typeface="맑은 고딕" charset="0"/>
               </a:rPr>
-              <a:t>런 다음</a:t>
-            </a:r>
-            <a:r>
-              <a:rPr lang="ko-KR" sz="1800">
-                <a:latin typeface="맑은 고딕" charset="0"/>
-                <a:ea typeface="맑은 고딕" charset="0"/>
-              </a:rPr>
-              <a:t> 광선과 </a:t>
-            </a:r>
-            <a:r>
-              <a:rPr lang="ko-KR" sz="1800">
-                <a:latin typeface="맑은 고딕" charset="0"/>
-                <a:ea typeface="맑은 고딕" charset="0"/>
-              </a:rPr>
-              <a:t>콜라이더를 가지고 있는</a:t>
-            </a:r>
-            <a:r>
-              <a:rPr lang="ko-KR" sz="1800">
-                <a:latin typeface="맑은 고딕" charset="0"/>
-                <a:ea typeface="맑은 고딕" charset="0"/>
-              </a:rPr>
-              <a:t> 오브젝트가 충돌했다면 Scene View에서 광선이 표시</a:t>
-            </a:r>
-            <a:r>
-              <a:rPr lang="ko-KR" sz="1800">
-                <a:latin typeface="맑은 고딕" charset="0"/>
-                <a:ea typeface="맑은 고딕" charset="0"/>
-              </a:rPr>
-              <a:t>됩니다.</a:t>
+              <a:t>Bot 오브젝트의 Layer를 Monster로 변경합니다.</a:t>
             </a:r>
             <a:endParaRPr lang="ko-KR" altLang="en-US" sz="1800">
               <a:latin typeface="맑은 고딕" charset="0"/>
@@ -9465,7 +9946,7 @@
       </p:sp>
       <p:pic>
         <p:nvPicPr>
-          <p:cNvPr id="1136" name="Picture " descr="C:/Users/Admin1/AppData/Roaming/PolarisOffice/ETemp/3276_19845488/fImage112411028467.png"/>
+          <p:cNvPr id="8" name="그림 38" descr="C:/Users/Admin1/AppData/Roaming/PolarisOffice/ETemp/20872_11383232/fImage65262451478.png"/>
           <p:cNvPicPr>
             <a:picLocks noChangeAspect="1"/>
           </p:cNvPicPr>
@@ -9485,8 +9966,8 @@
         </p:blipFill>
         <p:spPr>
           <a:xfrm rot="0">
-            <a:off x="1295400" y="1226820"/>
-            <a:ext cx="4058285" cy="3364865"/>
+            <a:off x="1334135" y="1446530"/>
+            <a:ext cx="970280" cy="1057275"/>
           </a:xfrm>
           <a:prstGeom prst="roundRect"/>
           <a:solidFill>
@@ -9496,17 +9977,17 @@
       </p:pic>
       <p:pic>
         <p:nvPicPr>
-          <p:cNvPr id="1137" name="그림 29" descr="C:/Users/Admin1/AppData/Roaming/PolarisOffice/ETemp/3276_19845488/fImage152002566500.png"/>
+          <p:cNvPr id="9" name="그림 40" descr="C:/Users/Admin1/AppData/Roaming/PolarisOffice/ETemp/20872_11383232/fImage116452419169.png"/>
           <p:cNvPicPr>
             <a:picLocks noChangeAspect="1"/>
           </p:cNvPicPr>
           <p:nvPr/>
         </p:nvPicPr>
         <p:blipFill rotWithShape="1">
-          <a:blip r:embed="rId3" cstate="hqprint">
+          <a:blip r:embed="rId3" cstate="print">
             <a:extLst>
               <a:ext uri="{28A0092B-C50C-407E-A947-70E740481C1C}">
-                <a14:useLocalDpi xmlns:a14="http://schemas.microsoft.com/office/drawing/2010/main"/>
+                <a14:useLocalDpi xmlns:a14="http://schemas.microsoft.com/office/drawing/2010/main" val="0"/>
               </a:ext>
             </a:extLst>
           </a:blip>
@@ -9516,8 +9997,8 @@
         </p:blipFill>
         <p:spPr>
           <a:xfrm rot="0">
-            <a:off x="6800850" y="1228090"/>
-            <a:ext cx="2391410" cy="3687445"/>
+            <a:off x="2433320" y="1374775"/>
+            <a:ext cx="2953385" cy="1180465"/>
           </a:xfrm>
           <a:prstGeom prst="roundRect"/>
           <a:solidFill>
@@ -9525,80 +10006,9 @@
           </a:solidFill>
         </p:spPr>
       </p:pic>
-      <p:sp>
-        <p:nvSpPr>
-          <p:cNvPr id="1141" name="텍스트 상자 37"/>
-          <p:cNvSpPr txBox="1">
-            <a:spLocks/>
-          </p:cNvSpPr>
-          <p:nvPr/>
-        </p:nvSpPr>
-        <p:spPr>
-          <a:xfrm rot="0">
-            <a:off x="6810375" y="5133975"/>
-            <a:ext cx="4210685" cy="584835"/>
-          </a:xfrm>
-          <a:prstGeom prst="rect"/>
-          <a:noFill/>
-        </p:spPr>
-        <p:txBody>
-          <a:bodyPr wrap="square" lIns="0" tIns="0" rIns="0" bIns="0" vert="horz" anchor="t">
-            <a:noAutofit/>
-          </a:bodyPr>
-          <a:lstStyle/>
-          <a:p>
-            <a:pPr marL="0" indent="0" algn="l" latinLnBrk="0" hangingPunct="1">
-              <a:buFontTx/>
-              <a:buNone/>
-            </a:pPr>
-            <a:r>
-              <a:rPr lang="ko-KR" sz="2000" b="1">
-                <a:solidFill>
-                  <a:srgbClr val="0611F2"/>
-                </a:solidFill>
-                <a:latin typeface="맑은 고딕" charset="0"/>
-                <a:ea typeface="맑은 고딕" charset="0"/>
-              </a:rPr>
-              <a:t>19. </a:t>
-            </a:r>
-            <a:r>
-              <a:rPr lang="ko-KR" sz="1800">
-                <a:latin typeface="맑은 고딕" charset="0"/>
-                <a:ea typeface="맑은 고딕" charset="0"/>
-              </a:rPr>
-              <a:t>그리고 3D Object</a:t>
-            </a:r>
-            <a:r>
-              <a:rPr lang="ko-KR" sz="1800">
-                <a:latin typeface="맑은 고딕" charset="0"/>
-                <a:ea typeface="맑은 고딕" charset="0"/>
-              </a:rPr>
-              <a:t> 에서</a:t>
-            </a:r>
-            <a:r>
-              <a:rPr lang="ko-KR" sz="1800">
-                <a:latin typeface="맑은 고딕" charset="0"/>
-                <a:ea typeface="맑은 고딕" charset="0"/>
-              </a:rPr>
-              <a:t> Cube를 생성한 다음</a:t>
-            </a:r>
-            <a:r>
-              <a:rPr lang="ko-KR" sz="1800">
-                <a:latin typeface="맑은 고딕" charset="0"/>
-                <a:ea typeface="맑은 고딕" charset="0"/>
-              </a:rPr>
-              <a:t> Bot으로 이름을 정의합니다.</a:t>
-            </a:r>
-            <a:endParaRPr lang="ko-KR" altLang="en-US" sz="1800">
-              <a:latin typeface="맑은 고딕" charset="0"/>
-              <a:ea typeface="맑은 고딕" charset="0"/>
-            </a:endParaRPr>
-          </a:p>
-        </p:txBody>
-      </p:sp>
       <p:pic>
         <p:nvPicPr>
-          <p:cNvPr id="1142" name="그림 38" descr="C:/Users/Admin1/AppData/Roaming/PolarisOffice/ETemp/3276_19845488/fImage65262451478.png"/>
+          <p:cNvPr id="10" name="그림 43" descr="C:/Users/Admin1/AppData/Roaming/PolarisOffice/ETemp/20872_11383232/fImage61852425724.png"/>
           <p:cNvPicPr>
             <a:picLocks noChangeAspect="1"/>
           </p:cNvPicPr>
@@ -9618,8 +10028,8 @@
         </p:blipFill>
         <p:spPr>
           <a:xfrm rot="0">
-            <a:off x="9548495" y="1661795"/>
-            <a:ext cx="1477010" cy="2815590"/>
+            <a:off x="1323975" y="3471545"/>
+            <a:ext cx="4054475" cy="1213485"/>
           </a:xfrm>
           <a:prstGeom prst="roundRect"/>
           <a:solidFill>
@@ -9627,6 +10037,178 @@
           </a:solidFill>
         </p:spPr>
       </p:pic>
+      <p:sp>
+        <p:nvSpPr>
+          <p:cNvPr id="11" name="텍스트 상자 46"/>
+          <p:cNvSpPr txBox="1">
+            <a:spLocks/>
+          </p:cNvSpPr>
+          <p:nvPr/>
+        </p:nvSpPr>
+        <p:spPr>
+          <a:xfrm rot="0">
+            <a:off x="1327785" y="4876165"/>
+            <a:ext cx="4058920" cy="1021080"/>
+          </a:xfrm>
+          <a:prstGeom prst="rect"/>
+          <a:noFill/>
+        </p:spPr>
+        <p:txBody>
+          <a:bodyPr wrap="square" lIns="0" tIns="0" rIns="0" bIns="0" numCol="1" vert="horz" anchor="t">
+            <a:noAutofit/>
+          </a:bodyPr>
+          <a:lstStyle/>
+          <a:p>
+            <a:pPr marL="0" indent="0" algn="l" latinLnBrk="0" hangingPunct="1">
+              <a:buFontTx/>
+              <a:buNone/>
+            </a:pPr>
+            <a:r>
+              <a:rPr lang="ko-KR" sz="2000" b="1">
+                <a:solidFill>
+                  <a:srgbClr val="0611F2"/>
+                </a:solidFill>
+                <a:latin typeface="맑은 고딕" charset="0"/>
+                <a:ea typeface="맑은 고딕" charset="0"/>
+              </a:rPr>
+              <a:t>16</a:t>
+            </a:r>
+            <a:r>
+              <a:rPr lang="ko-KR" sz="2000" b="1">
+                <a:solidFill>
+                  <a:srgbClr val="0611F2"/>
+                </a:solidFill>
+                <a:latin typeface="맑은 고딕" charset="0"/>
+                <a:ea typeface="맑은 고딕" charset="0"/>
+              </a:rPr>
+              <a:t>. </a:t>
+            </a:r>
+            <a:r>
+              <a:rPr lang="ko-KR" sz="1800">
+                <a:latin typeface="맑은 고딕" charset="0"/>
+                <a:ea typeface="맑은 고딕" charset="0"/>
+              </a:rPr>
+              <a:t>마지막으로</a:t>
+            </a:r>
+            <a:r>
+              <a:rPr lang="ko-KR" sz="1800">
+                <a:latin typeface="맑은 고딕" charset="0"/>
+                <a:ea typeface="맑은 고딕" charset="0"/>
+              </a:rPr>
+              <a:t> </a:t>
+            </a:r>
+            <a:r>
+              <a:rPr lang="ko-KR" sz="1800">
+                <a:latin typeface="맑은 고딕" charset="0"/>
+                <a:ea typeface="맑은 고딕" charset="0"/>
+              </a:rPr>
+              <a:t>Main Camera 오브젝트에 있는 Picking 스크립트에 Layer를 Monster로 설정합니다.</a:t>
+            </a:r>
+            <a:endParaRPr lang="ko-KR" altLang="en-US" sz="1800">
+              <a:latin typeface="맑은 고딕" charset="0"/>
+              <a:ea typeface="맑은 고딕" charset="0"/>
+            </a:endParaRPr>
+          </a:p>
+        </p:txBody>
+      </p:sp>
+      <p:pic>
+        <p:nvPicPr>
+          <p:cNvPr id="12" name="그림 47" descr="C:/Users/Admin1/AppData/Roaming/PolarisOffice/ETemp/20872_11383232/fImage1464832441478.png"/>
+          <p:cNvPicPr>
+            <a:picLocks noChangeAspect="1"/>
+          </p:cNvPicPr>
+          <p:nvPr/>
+        </p:nvPicPr>
+        <p:blipFill rotWithShape="1">
+          <a:blip r:embed="rId5" cstate="print">
+            <a:extLst>
+              <a:ext uri="{28A0092B-C50C-407E-A947-70E740481C1C}">
+                <a14:useLocalDpi xmlns:a14="http://schemas.microsoft.com/office/drawing/2010/main" val="0"/>
+              </a:ext>
+            </a:extLst>
+          </a:blip>
+          <a:stretch>
+            <a:fillRect/>
+          </a:stretch>
+        </p:blipFill>
+        <p:spPr>
+          <a:xfrm rot="0">
+            <a:off x="6823710" y="1376680"/>
+            <a:ext cx="4251960" cy="2875915"/>
+          </a:xfrm>
+          <a:prstGeom prst="roundRect"/>
+          <a:solidFill>
+            <a:srgbClr val="EDEDED"/>
+          </a:solidFill>
+        </p:spPr>
+      </p:pic>
+      <p:sp>
+        <p:nvSpPr>
+          <p:cNvPr id="13" name="텍스트 상자 50"/>
+          <p:cNvSpPr txBox="1">
+            <a:spLocks/>
+          </p:cNvSpPr>
+          <p:nvPr/>
+        </p:nvSpPr>
+        <p:spPr>
+          <a:xfrm rot="0">
+            <a:off x="6823710" y="4454525"/>
+            <a:ext cx="4260850" cy="1443355"/>
+          </a:xfrm>
+          <a:prstGeom prst="rect"/>
+          <a:noFill/>
+        </p:spPr>
+        <p:txBody>
+          <a:bodyPr wrap="square" lIns="0" tIns="0" rIns="0" bIns="0" numCol="1" vert="horz" anchor="t">
+            <a:noAutofit/>
+          </a:bodyPr>
+          <a:lstStyle/>
+          <a:p>
+            <a:pPr marL="0" indent="0" algn="l" latinLnBrk="0" hangingPunct="1">
+              <a:buFontTx/>
+              <a:buNone/>
+            </a:pPr>
+            <a:r>
+              <a:rPr lang="ko-KR" sz="1800">
+                <a:latin typeface="맑은 고딕" charset="0"/>
+                <a:ea typeface="맑은 고딕" charset="0"/>
+              </a:rPr>
+              <a:t>LayerMask로 특정한 Layer만 검출하여 충돌하도록 설정할 수 있습니다.</a:t>
+            </a:r>
+            <a:endParaRPr lang="ko-KR" altLang="en-US" sz="1800">
+              <a:latin typeface="맑은 고딕" charset="0"/>
+              <a:ea typeface="맑은 고딕" charset="0"/>
+            </a:endParaRPr>
+          </a:p>
+          <a:p>
+            <a:pPr marL="0" indent="0" algn="l" latinLnBrk="0" hangingPunct="1">
+              <a:buFontTx/>
+              <a:buNone/>
+            </a:pPr>
+            <a:endParaRPr lang="ko-KR" altLang="en-US" sz="1800">
+              <a:latin typeface="맑은 고딕" charset="0"/>
+              <a:ea typeface="맑은 고딕" charset="0"/>
+            </a:endParaRPr>
+          </a:p>
+          <a:p>
+            <a:pPr marL="0" indent="0" algn="l" latinLnBrk="0" hangingPunct="1">
+              <a:buFontTx/>
+              <a:buNone/>
+            </a:pPr>
+            <a:r>
+              <a:rPr lang="ko-KR" sz="1800">
+                <a:latin typeface="맑은 고딕" charset="0"/>
+                <a:ea typeface="맑은 고딕" charset="0"/>
+              </a:rPr>
+              <a:t>LayerMask는 32 bit의 int 형으로 bit로 각각의 레이어를 구분하여 사용합니다.</a:t>
+            </a:r>
+            <a:endParaRPr lang="ko-KR" altLang="en-US" sz="1800">
+              <a:latin typeface="맑은 고딕" charset="0"/>
+              <a:ea typeface="맑은 고딕" charset="0"/>
+            </a:endParaRPr>
+          </a:p>
+        </p:txBody>
+      </p:sp>
     </p:spTree>
   </p:cSld>
   <p:clrMapOvr>

</xml_diff>